<commit_message>
Improved Architecture Diagram II
</commit_message>
<xml_diff>
--- a/Architecture.pptx
+++ b/Architecture.pptx
@@ -5046,6 +5046,10 @@
               <a:p>
                 <a:pPr algn="ctr"/>
                 <a:r>
+                  <a:rPr lang="pt-PT" sz="3200" dirty="0"/>
+                  <a:t>1. </a:t>
+                </a:r>
+                <a:r>
                   <a:rPr lang="pt-PT" sz="3200" dirty="0" err="1"/>
                   <a:t>image</a:t>
                 </a:r>
@@ -5220,14 +5224,18 @@
                   <a:rPr lang="pt-PT" sz="3200" dirty="0"/>
                   <a:t> </a:t>
                 </a:r>
+              </a:p>
+              <a:p>
                 <a:r>
-                  <a:rPr lang="pt-PT" sz="3200" dirty="0" err="1">
+                  <a:rPr lang="pt-PT" sz="3200" dirty="0">
                     <a:solidFill>
                       <a:schemeClr val="tx1"/>
                     </a:solidFill>
                   </a:rPr>
-                  <a:t>image</a:t>
+                  <a:t>2.Image</a:t>
                 </a:r>
+              </a:p>
+              <a:p>
                 <a:endParaRPr lang="pt-PT" sz="3200" dirty="0">
                   <a:solidFill>
                     <a:schemeClr val="tx1"/>
@@ -5322,6 +5330,10 @@
               <a:p>
                 <a:pPr algn="r"/>
                 <a:r>
+                  <a:rPr lang="pt-PT" sz="3200" dirty="0"/>
+                  <a:t>3. </a:t>
+                </a:r>
+                <a:r>
                   <a:rPr lang="pt-PT" sz="3200" dirty="0" err="1"/>
                   <a:t>emotion</a:t>
                 </a:r>
@@ -5363,7 +5375,7 @@
           </p:nvSpPr>
           <p:spPr>
             <a:xfrm rot="1648140">
-              <a:off x="5052090" y="-1416052"/>
+              <a:off x="5490563" y="-2397087"/>
               <a:ext cx="2012410" cy="369332"/>
             </a:xfrm>
             <a:prstGeom prst="rect">
@@ -5422,6 +5434,111 @@
           </p:txBody>
         </p:sp>
       </p:grpSp>
+      <p:sp>
+        <p:nvSpPr>
+          <p:cNvPr id="47" name="Arrow: Curved Right 46">
+            <a:extLst>
+              <a:ext uri="{FF2B5EF4-FFF2-40B4-BE49-F238E27FC236}">
+                <a16:creationId xmlns:a16="http://schemas.microsoft.com/office/drawing/2014/main" id="{94BF2876-039B-4E90-B749-48C9F8C1B583}"/>
+              </a:ext>
+            </a:extLst>
+          </p:cNvPr>
+          <p:cNvSpPr/>
+          <p:nvPr/>
+        </p:nvSpPr>
+        <p:spPr>
+          <a:xfrm flipH="1">
+            <a:off x="4665147" y="-1859363"/>
+            <a:ext cx="2506814" cy="6097882"/>
+          </a:xfrm>
+          <a:prstGeom prst="curvedRightArrow">
+            <a:avLst>
+              <a:gd name="adj1" fmla="val 17393"/>
+              <a:gd name="adj2" fmla="val 50000"/>
+              <a:gd name="adj3" fmla="val 25000"/>
+            </a:avLst>
+          </a:prstGeom>
+        </p:spPr>
+        <p:style>
+          <a:lnRef idx="2">
+            <a:schemeClr val="accent3">
+              <a:shade val="50000"/>
+            </a:schemeClr>
+          </a:lnRef>
+          <a:fillRef idx="1">
+            <a:schemeClr val="accent3"/>
+          </a:fillRef>
+          <a:effectRef idx="0">
+            <a:schemeClr val="accent3"/>
+          </a:effectRef>
+          <a:fontRef idx="minor">
+            <a:schemeClr val="lt1"/>
+          </a:fontRef>
+        </p:style>
+        <p:txBody>
+          <a:bodyPr vert="horz" rtlCol="0" anchor="ctr"/>
+          <a:lstStyle/>
+          <a:p>
+            <a:r>
+              <a:rPr lang="pt-PT" sz="3200" dirty="0"/>
+              <a:t> </a:t>
+            </a:r>
+            <a:endParaRPr lang="en-US" sz="3200" dirty="0"/>
+          </a:p>
+        </p:txBody>
+      </p:sp>
+      <p:sp>
+        <p:nvSpPr>
+          <p:cNvPr id="48" name="TextBox 47">
+            <a:extLst>
+              <a:ext uri="{FF2B5EF4-FFF2-40B4-BE49-F238E27FC236}">
+                <a16:creationId xmlns:a16="http://schemas.microsoft.com/office/drawing/2014/main" id="{ACB9D09A-B588-46FB-A587-12540E3755B1}"/>
+              </a:ext>
+            </a:extLst>
+          </p:cNvPr>
+          <p:cNvSpPr txBox="1"/>
+          <p:nvPr/>
+        </p:nvSpPr>
+        <p:spPr>
+          <a:xfrm>
+            <a:off x="3938561" y="261754"/>
+            <a:ext cx="3067715" cy="1323439"/>
+          </a:xfrm>
+          <a:prstGeom prst="rect">
+            <a:avLst/>
+          </a:prstGeom>
+          <a:noFill/>
+        </p:spPr>
+        <p:txBody>
+          <a:bodyPr wrap="square" rtlCol="0">
+            <a:spAutoFit/>
+          </a:bodyPr>
+          <a:lstStyle/>
+          <a:p>
+            <a:pPr algn="r"/>
+            <a:r>
+              <a:rPr lang="pt-PT" sz="3200" dirty="0"/>
+              <a:t>4. </a:t>
+            </a:r>
+            <a:r>
+              <a:rPr lang="pt-PT" sz="3200" dirty="0" err="1"/>
+              <a:t>emotion</a:t>
+            </a:r>
+            <a:r>
+              <a:rPr lang="pt-PT" sz="3200" dirty="0"/>
+              <a:t> </a:t>
+            </a:r>
+          </a:p>
+          <a:p>
+            <a:pPr algn="r"/>
+            <a:r>
+              <a:rPr lang="en-US" sz="2400" b="1" i="1" dirty="0"/>
+              <a:t>Topic “p30-classification”</a:t>
+            </a:r>
+            <a:endParaRPr lang="en-US" sz="2400" i="1" dirty="0"/>
+          </a:p>
+        </p:txBody>
+      </p:sp>
     </p:spTree>
     <p:extLst>
       <p:ext uri="{BB962C8B-B14F-4D97-AF65-F5344CB8AC3E}">

</xml_diff>